<commit_message>
update what you will do today slides
</commit_message>
<xml_diff>
--- a/slides_day-1.pptx
+++ b/slides_day-1.pptx
@@ -260,7 +260,7 @@
           <a:p>
             <a:fld id="{EE53EDDD-3DA3-4AAC-95AA-050495F7F225}" type="datetimeFigureOut">
               <a:rPr lang="en-AU" smtClean="0"/>
-              <a:t>21/07/2020</a:t>
+              <a:t>24/07/2020</a:t>
             </a:fld>
             <a:endParaRPr lang="en-AU"/>
           </a:p>
@@ -1133,7 +1133,7 @@
             <a:fld id="{1D8BD707-D9CF-40AE-B4C6-C98DA3205C09}" type="datetimeFigureOut">
               <a:rPr lang="en-US" smtClean="0"/>
               <a:pPr/>
-              <a:t>7/21/2020</a:t>
+              <a:t>7/24/2020</a:t>
             </a:fld>
             <a:endParaRPr lang="en-US"/>
           </a:p>
@@ -1307,7 +1307,7 @@
             <a:fld id="{1D8BD707-D9CF-40AE-B4C6-C98DA3205C09}" type="datetimeFigureOut">
               <a:rPr lang="en-US" smtClean="0"/>
               <a:pPr/>
-              <a:t>7/21/2020</a:t>
+              <a:t>7/24/2020</a:t>
             </a:fld>
             <a:endParaRPr lang="en-US"/>
           </a:p>
@@ -1491,7 +1491,7 @@
             <a:fld id="{1D8BD707-D9CF-40AE-B4C6-C98DA3205C09}" type="datetimeFigureOut">
               <a:rPr lang="en-US" smtClean="0"/>
               <a:pPr/>
-              <a:t>7/21/2020</a:t>
+              <a:t>7/24/2020</a:t>
             </a:fld>
             <a:endParaRPr lang="en-US"/>
           </a:p>
@@ -1669,7 +1669,7 @@
             <a:fld id="{1D8BD707-D9CF-40AE-B4C6-C98DA3205C09}" type="datetimeFigureOut">
               <a:rPr lang="en-US" smtClean="0"/>
               <a:pPr/>
-              <a:t>7/21/2020</a:t>
+              <a:t>7/24/2020</a:t>
             </a:fld>
             <a:endParaRPr lang="en-US"/>
           </a:p>
@@ -1919,7 +1919,7 @@
             <a:fld id="{1D8BD707-D9CF-40AE-B4C6-C98DA3205C09}" type="datetimeFigureOut">
               <a:rPr lang="en-US" smtClean="0"/>
               <a:pPr/>
-              <a:t>7/21/2020</a:t>
+              <a:t>7/24/2020</a:t>
             </a:fld>
             <a:endParaRPr lang="en-US"/>
           </a:p>
@@ -2211,7 +2211,7 @@
             <a:fld id="{1D8BD707-D9CF-40AE-B4C6-C98DA3205C09}" type="datetimeFigureOut">
               <a:rPr lang="en-US" smtClean="0"/>
               <a:pPr/>
-              <a:t>7/21/2020</a:t>
+              <a:t>7/24/2020</a:t>
             </a:fld>
             <a:endParaRPr lang="en-US"/>
           </a:p>
@@ -2637,7 +2637,7 @@
             <a:fld id="{1D8BD707-D9CF-40AE-B4C6-C98DA3205C09}" type="datetimeFigureOut">
               <a:rPr lang="en-US" smtClean="0"/>
               <a:pPr/>
-              <a:t>7/21/2020</a:t>
+              <a:t>7/24/2020</a:t>
             </a:fld>
             <a:endParaRPr lang="en-US"/>
           </a:p>
@@ -2759,7 +2759,7 @@
             <a:fld id="{1D8BD707-D9CF-40AE-B4C6-C98DA3205C09}" type="datetimeFigureOut">
               <a:rPr lang="en-US" smtClean="0"/>
               <a:pPr/>
-              <a:t>7/21/2020</a:t>
+              <a:t>7/24/2020</a:t>
             </a:fld>
             <a:endParaRPr lang="en-US"/>
           </a:p>
@@ -2858,7 +2858,7 @@
             <a:fld id="{1D8BD707-D9CF-40AE-B4C6-C98DA3205C09}" type="datetimeFigureOut">
               <a:rPr lang="en-US" smtClean="0"/>
               <a:pPr/>
-              <a:t>7/21/2020</a:t>
+              <a:t>7/24/2020</a:t>
             </a:fld>
             <a:endParaRPr lang="en-US"/>
           </a:p>
@@ -3139,7 +3139,7 @@
             <a:fld id="{1D8BD707-D9CF-40AE-B4C6-C98DA3205C09}" type="datetimeFigureOut">
               <a:rPr lang="en-US" smtClean="0"/>
               <a:pPr/>
-              <a:t>7/21/2020</a:t>
+              <a:t>7/24/2020</a:t>
             </a:fld>
             <a:endParaRPr lang="en-US"/>
           </a:p>
@@ -3396,7 +3396,7 @@
             <a:fld id="{1D8BD707-D9CF-40AE-B4C6-C98DA3205C09}" type="datetimeFigureOut">
               <a:rPr lang="en-US" smtClean="0"/>
               <a:pPr/>
-              <a:t>7/21/2020</a:t>
+              <a:t>7/24/2020</a:t>
             </a:fld>
             <a:endParaRPr lang="en-US"/>
           </a:p>
@@ -3613,7 +3613,7 @@
             <a:fld id="{1D8BD707-D9CF-40AE-B4C6-C98DA3205C09}" type="datetimeFigureOut">
               <a:rPr lang="en-US" smtClean="0"/>
               <a:pPr/>
-              <a:t>7/21/2020</a:t>
+              <a:t>7/24/2020</a:t>
             </a:fld>
             <a:endParaRPr lang="en-US"/>
           </a:p>
@@ -21243,37 +21243,48 @@
           </a:xfrm>
         </p:spPr>
         <p:txBody>
-          <a:bodyPr/>
-          <a:lstStyle/>
-          <a:p>
-            <a:pPr marL="514350" indent="-514350">
+          <a:bodyPr>
+            <a:normAutofit/>
+          </a:bodyPr>
+          <a:lstStyle/>
+          <a:p>
+            <a:r>
+              <a:rPr lang="en-AU" dirty="0" smtClean="0"/>
+              <a:t>Workshop manual sections 1—4.</a:t>
+            </a:r>
+          </a:p>
+          <a:p>
+            <a:pPr marL="857250" lvl="1" indent="-457200"/>
+            <a:r>
+              <a:rPr lang="en-AU" dirty="0" smtClean="0"/>
+              <a:t>Learn how to work with spatial data in R</a:t>
+            </a:r>
+          </a:p>
+          <a:p>
+            <a:pPr marL="857250" lvl="1" indent="-457200"/>
+            <a:r>
+              <a:rPr lang="en-AU" dirty="0" smtClean="0"/>
+              <a:t>Perform a gap analysis</a:t>
+            </a:r>
+          </a:p>
+          <a:p>
+            <a:pPr marL="857250" lvl="1" indent="-457200"/>
+            <a:r>
+              <a:rPr lang="en-AU" dirty="0" smtClean="0"/>
+              <a:t>Answer questions in the manua</a:t>
+            </a:r>
+            <a:r>
+              <a:rPr lang="en-AU" dirty="0"/>
+              <a:t>l</a:t>
+            </a:r>
+            <a:endParaRPr lang="en-AU" dirty="0" smtClean="0"/>
+          </a:p>
+          <a:p>
+            <a:pPr marL="914400" lvl="1" indent="-514350">
               <a:buFont typeface="+mj-lt"/>
               <a:buAutoNum type="arabicPeriod"/>
             </a:pPr>
-            <a:r>
-              <a:rPr lang="en-AU" dirty="0" smtClean="0"/>
-              <a:t>Explain the exercises </a:t>
-            </a:r>
-          </a:p>
-          <a:p>
-            <a:pPr marL="514350" indent="-514350">
-              <a:buFont typeface="+mj-lt"/>
-              <a:buAutoNum type="arabicPeriod"/>
-            </a:pPr>
-            <a:r>
-              <a:rPr lang="en-AU" dirty="0" smtClean="0"/>
-              <a:t>Explain manual formats (text, code vs output)</a:t>
-            </a:r>
-          </a:p>
-          <a:p>
-            <a:pPr marL="514350" indent="-514350">
-              <a:buFont typeface="+mj-lt"/>
-              <a:buAutoNum type="arabicPeriod"/>
-            </a:pPr>
-            <a:r>
-              <a:rPr lang="en-AU" dirty="0" smtClean="0"/>
-              <a:t>Explain questions/answers</a:t>
-            </a:r>
+            <a:endParaRPr lang="en-AU" dirty="0" smtClean="0"/>
           </a:p>
           <a:p>
             <a:pPr marL="514350" indent="-514350">
@@ -21281,6 +21292,40 @@
               <a:buAutoNum type="arabicPeriod"/>
             </a:pPr>
             <a:endParaRPr lang="en-AU" dirty="0"/>
+          </a:p>
+        </p:txBody>
+      </p:sp>
+      <p:sp>
+        <p:nvSpPr>
+          <p:cNvPr id="4" name="TextBox 3"/>
+          <p:cNvSpPr txBox="1"/>
+          <p:nvPr/>
+        </p:nvSpPr>
+        <p:spPr>
+          <a:xfrm>
+            <a:off x="358449" y="4076991"/>
+            <a:ext cx="8718669" cy="646331"/>
+          </a:xfrm>
+          <a:prstGeom prst="rect">
+            <a:avLst/>
+          </a:prstGeom>
+          <a:noFill/>
+        </p:spPr>
+        <p:txBody>
+          <a:bodyPr wrap="none" rtlCol="0">
+            <a:spAutoFit/>
+          </a:bodyPr>
+          <a:lstStyle/>
+          <a:p>
+            <a:r>
+              <a:rPr lang="en-AU" sz="3600" dirty="0"/>
+              <a:t>https://</a:t>
+            </a:r>
+            <a:r>
+              <a:rPr lang="en-AU" sz="3600" dirty="0" smtClean="0"/>
+              <a:t>prioritizr.github.io/massey-workshop</a:t>
+            </a:r>
+            <a:endParaRPr lang="en-AU" sz="3600" dirty="0"/>
           </a:p>
         </p:txBody>
       </p:sp>

</xml_diff>